<commit_message>
Update Crime Rate in relation to Weather in Atlanta.pptx
</commit_message>
<xml_diff>
--- a/Crime Rate in relation to Weather in Atlanta.pptx
+++ b/Crime Rate in relation to Weather in Atlanta.pptx
@@ -11471,45 +11471,12 @@
           <a:lstStyle/>
           <a:p>
             <a:r>
-              <a:rPr lang="en-US" dirty="0" err="1"/>
-              <a:t>Predicition</a:t>
-            </a:r>
-            <a:r>
               <a:rPr lang="en-US" dirty="0"/>
-              <a:t> model based on Weather</a:t>
+              <a:t>Predication model based on Weather</a:t>
             </a:r>
           </a:p>
         </p:txBody>
       </p:sp>
-      <p:pic>
-        <p:nvPicPr>
-          <p:cNvPr id="6" name="Content Placeholder 5" descr="Chart, scatter chart&#10;&#10;Description automatically generated">
-            <a:extLst>
-              <a:ext uri="{FF2B5EF4-FFF2-40B4-BE49-F238E27FC236}">
-                <a16:creationId xmlns:a16="http://schemas.microsoft.com/office/drawing/2014/main" id="{38B04E02-3E94-CC9D-C0D0-A96FC0B1F6E5}"/>
-              </a:ext>
-            </a:extLst>
-          </p:cNvPr>
-          <p:cNvPicPr>
-            <a:picLocks noGrp="1" noChangeAspect="1"/>
-          </p:cNvPicPr>
-          <p:nvPr>
-            <p:ph idx="1"/>
-          </p:nvPr>
-        </p:nvPicPr>
-        <p:blipFill>
-          <a:blip r:embed="rId2"/>
-          <a:stretch>
-            <a:fillRect/>
-          </a:stretch>
-        </p:blipFill>
-        <p:spPr>
-          <a:xfrm>
-            <a:off x="5928037" y="1694877"/>
-            <a:ext cx="4990476" cy="3530159"/>
-          </a:xfrm>
-        </p:spPr>
-      </p:pic>
       <p:sp>
         <p:nvSpPr>
           <p:cNvPr id="4" name="Text Placeholder 3">
@@ -11535,6 +11502,38 @@
           </a:p>
         </p:txBody>
       </p:sp>
+      <p:pic>
+        <p:nvPicPr>
+          <p:cNvPr id="7" name="Content Placeholder 6">
+            <a:extLst>
+              <a:ext uri="{FF2B5EF4-FFF2-40B4-BE49-F238E27FC236}">
+                <a16:creationId xmlns:a16="http://schemas.microsoft.com/office/drawing/2014/main" id="{D9897587-4CCD-FC08-96DD-4E49B999CF5D}"/>
+              </a:ext>
+            </a:extLst>
+          </p:cNvPr>
+          <p:cNvPicPr>
+            <a:picLocks noGrp="1" noChangeAspect="1"/>
+          </p:cNvPicPr>
+          <p:nvPr>
+            <p:ph idx="1"/>
+          </p:nvPr>
+        </p:nvPicPr>
+        <p:blipFill>
+          <a:blip r:embed="rId2"/>
+          <a:stretch>
+            <a:fillRect/>
+          </a:stretch>
+        </p:blipFill>
+        <p:spPr>
+          <a:xfrm>
+            <a:off x="5459413" y="1457735"/>
+            <a:ext cx="5927725" cy="4004443"/>
+          </a:xfrm>
+          <a:prstGeom prst="rect">
+            <a:avLst/>
+          </a:prstGeom>
+        </p:spPr>
+      </p:pic>
     </p:spTree>
     <p:extLst>
       <p:ext uri="{BB962C8B-B14F-4D97-AF65-F5344CB8AC3E}">
@@ -13747,35 +13746,6 @@
           </a:p>
         </p:txBody>
       </p:sp>
-      <p:pic>
-        <p:nvPicPr>
-          <p:cNvPr id="6" name="Content Placeholder 5" descr="Chart&#10;&#10;Description automatically generated">
-            <a:extLst>
-              <a:ext uri="{FF2B5EF4-FFF2-40B4-BE49-F238E27FC236}">
-                <a16:creationId xmlns:a16="http://schemas.microsoft.com/office/drawing/2014/main" id="{DCB17369-3519-2BAC-4042-448E618FFECE}"/>
-              </a:ext>
-            </a:extLst>
-          </p:cNvPr>
-          <p:cNvPicPr>
-            <a:picLocks noGrp="1" noChangeAspect="1"/>
-          </p:cNvPicPr>
-          <p:nvPr>
-            <p:ph idx="1"/>
-          </p:nvPr>
-        </p:nvPicPr>
-        <p:blipFill>
-          <a:blip r:embed="rId2"/>
-          <a:stretch>
-            <a:fillRect/>
-          </a:stretch>
-        </p:blipFill>
-        <p:spPr>
-          <a:xfrm>
-            <a:off x="5889942" y="1459956"/>
-            <a:ext cx="5066666" cy="4000000"/>
-          </a:xfrm>
-        </p:spPr>
-      </p:pic>
       <p:sp>
         <p:nvSpPr>
           <p:cNvPr id="4" name="Text Placeholder 3">
@@ -13823,6 +13793,38 @@
           </a:p>
         </p:txBody>
       </p:sp>
+      <p:pic>
+        <p:nvPicPr>
+          <p:cNvPr id="8" name="Content Placeholder 7">
+            <a:extLst>
+              <a:ext uri="{FF2B5EF4-FFF2-40B4-BE49-F238E27FC236}">
+                <a16:creationId xmlns:a16="http://schemas.microsoft.com/office/drawing/2014/main" id="{B1358242-FCDD-56D3-3E3C-6E2D8972A75D}"/>
+              </a:ext>
+            </a:extLst>
+          </p:cNvPr>
+          <p:cNvPicPr>
+            <a:picLocks noGrp="1" noChangeAspect="1"/>
+          </p:cNvPicPr>
+          <p:nvPr>
+            <p:ph idx="1"/>
+          </p:nvPr>
+        </p:nvPicPr>
+        <p:blipFill>
+          <a:blip r:embed="rId2"/>
+          <a:stretch>
+            <a:fillRect/>
+          </a:stretch>
+        </p:blipFill>
+        <p:spPr>
+          <a:xfrm>
+            <a:off x="5459413" y="1455538"/>
+            <a:ext cx="5927725" cy="4008837"/>
+          </a:xfrm>
+          <a:prstGeom prst="rect">
+            <a:avLst/>
+          </a:prstGeom>
+        </p:spPr>
+      </p:pic>
     </p:spTree>
     <p:extLst>
       <p:ext uri="{BB962C8B-B14F-4D97-AF65-F5344CB8AC3E}">
@@ -14535,12 +14537,12 @@
 </file>
 
 <file path=customXml/item1.xml><?xml version="1.0" encoding="utf-8"?>
-<p:properties xmlns:p="http://schemas.microsoft.com/office/2006/metadata/properties" xmlns:xsi="http://www.w3.org/2001/XMLSchema-instance" xmlns:pc="http://schemas.microsoft.com/office/infopath/2007/PartnerControls">
-  <documentManagement>
-    <Status xmlns="71af3243-3dd4-4a8d-8c0d-dd76da1f02a5">Not started</Status>
-    <MediaServiceKeyPoints xmlns="71af3243-3dd4-4a8d-8c0d-dd76da1f02a5" xsi:nil="true"/>
-  </documentManagement>
-</p:properties>
+<?mso-contentType ?>
+<FormTemplates xmlns="http://schemas.microsoft.com/sharepoint/v3/contenttype/forms">
+  <Display>DocumentLibraryForm</Display>
+  <Edit>DocumentLibraryForm</Edit>
+  <New>DocumentLibraryForm</New>
+</FormTemplates>
 </file>
 
 <file path=customXml/item2.xml><?xml version="1.0" encoding="utf-8"?>
@@ -14765,20 +14767,18 @@
 </file>
 
 <file path=customXml/item3.xml><?xml version="1.0" encoding="utf-8"?>
-<?mso-contentType ?>
-<FormTemplates xmlns="http://schemas.microsoft.com/sharepoint/v3/contenttype/forms">
-  <Display>DocumentLibraryForm</Display>
-  <Edit>DocumentLibraryForm</Edit>
-  <New>DocumentLibraryForm</New>
-</FormTemplates>
+<p:properties xmlns:p="http://schemas.microsoft.com/office/2006/metadata/properties" xmlns:xsi="http://www.w3.org/2001/XMLSchema-instance" xmlns:pc="http://schemas.microsoft.com/office/infopath/2007/PartnerControls">
+  <documentManagement>
+    <Status xmlns="71af3243-3dd4-4a8d-8c0d-dd76da1f02a5">Not started</Status>
+    <MediaServiceKeyPoints xmlns="71af3243-3dd4-4a8d-8c0d-dd76da1f02a5" xsi:nil="true"/>
+  </documentManagement>
+</p:properties>
 </file>
 
 <file path=customXml/itemProps1.xml><?xml version="1.0" encoding="utf-8"?>
-<ds:datastoreItem xmlns:ds="http://schemas.openxmlformats.org/officeDocument/2006/customXml" ds:itemID="{A03EEFF0-FB57-4CB4-8BFC-DF397689E2ED}">
+<ds:datastoreItem xmlns:ds="http://schemas.openxmlformats.org/officeDocument/2006/customXml" ds:itemID="{AA3F7EDC-E5B4-4BBC-9D2A-CBE6D46C37AD}">
   <ds:schemaRefs>
-    <ds:schemaRef ds:uri="http://schemas.microsoft.com/office/2006/metadata/properties"/>
-    <ds:schemaRef ds:uri="http://schemas.microsoft.com/office/infopath/2007/PartnerControls"/>
-    <ds:schemaRef ds:uri="71af3243-3dd4-4a8d-8c0d-dd76da1f02a5"/>
+    <ds:schemaRef ds:uri="http://schemas.microsoft.com/sharepoint/v3/contenttype/forms"/>
   </ds:schemaRefs>
 </ds:datastoreItem>
 </file>
@@ -14803,9 +14803,11 @@
 </file>
 
 <file path=customXml/itemProps3.xml><?xml version="1.0" encoding="utf-8"?>
-<ds:datastoreItem xmlns:ds="http://schemas.openxmlformats.org/officeDocument/2006/customXml" ds:itemID="{AA3F7EDC-E5B4-4BBC-9D2A-CBE6D46C37AD}">
+<ds:datastoreItem xmlns:ds="http://schemas.openxmlformats.org/officeDocument/2006/customXml" ds:itemID="{A03EEFF0-FB57-4CB4-8BFC-DF397689E2ED}">
   <ds:schemaRefs>
-    <ds:schemaRef ds:uri="http://schemas.microsoft.com/sharepoint/v3/contenttype/forms"/>
+    <ds:schemaRef ds:uri="http://schemas.microsoft.com/office/2006/metadata/properties"/>
+    <ds:schemaRef ds:uri="http://schemas.microsoft.com/office/infopath/2007/PartnerControls"/>
+    <ds:schemaRef ds:uri="71af3243-3dd4-4a8d-8c0d-dd76da1f02a5"/>
   </ds:schemaRefs>
 </ds:datastoreItem>
 </file>
</xml_diff>